<commit_message>
update to pipeline figure
</commit_message>
<xml_diff>
--- a/images/figures.pptx
+++ b/images/figures.pptx
@@ -104,6 +104,11 @@
       </a:defRPr>
     </a:lvl9pPr>
   </p:defaultTextStyle>
+  <p:extLst>
+    <p:ext uri="{EFAFB233-063F-42B5-8137-9DF3F51BA10A}">
+      <p15:sldGuideLst xmlns:p15="http://schemas.microsoft.com/office/powerpoint/2012/main"/>
+    </p:ext>
+  </p:extLst>
 </p:presentation>
 </file>
 
@@ -3335,7 +3340,7 @@
         </p:nvSpPr>
         <p:spPr>
           <a:xfrm>
-            <a:off x="2438400" y="2148854"/>
+            <a:off x="2533875" y="2130745"/>
             <a:ext cx="7315200" cy="1828800"/>
           </a:xfrm>
           <a:prstGeom prst="rect">
@@ -3565,7 +3570,7 @@
         </p:nvSpPr>
         <p:spPr>
           <a:xfrm>
-            <a:off x="2712757" y="3669857"/>
+            <a:off x="2804358" y="3611878"/>
             <a:ext cx="822789" cy="307777"/>
           </a:xfrm>
           <a:prstGeom prst="rect">
@@ -3601,7 +3606,7 @@
         </p:nvSpPr>
         <p:spPr>
           <a:xfrm>
-            <a:off x="4278837" y="3669857"/>
+            <a:off x="4052243" y="3611878"/>
             <a:ext cx="672172" cy="307777"/>
           </a:xfrm>
           <a:prstGeom prst="rect">
@@ -3637,7 +3642,7 @@
         </p:nvSpPr>
         <p:spPr>
           <a:xfrm>
-            <a:off x="5684605" y="3669857"/>
+            <a:off x="5684605" y="3611878"/>
             <a:ext cx="598177" cy="307777"/>
           </a:xfrm>
           <a:prstGeom prst="rect">
@@ -3673,7 +3678,7 @@
         </p:nvSpPr>
         <p:spPr>
           <a:xfrm>
-            <a:off x="7245667" y="3669857"/>
+            <a:off x="7165594" y="3611878"/>
             <a:ext cx="667747" cy="307777"/>
           </a:xfrm>
           <a:prstGeom prst="rect">
@@ -3709,7 +3714,7 @@
         </p:nvSpPr>
         <p:spPr>
           <a:xfrm>
-            <a:off x="8656453" y="3669857"/>
+            <a:off x="8656453" y="3611878"/>
             <a:ext cx="840166" cy="307777"/>
           </a:xfrm>
           <a:prstGeom prst="rect">
@@ -3760,10 +3765,10 @@
           <a:lstStyle/>
           <a:p>
             <a:r>
-              <a:rPr lang="en-US" sz="1050" dirty="0" err="1"/>
+              <a:rPr lang="en-US" sz="1000" dirty="0" err="1"/>
               <a:t>NetCDF</a:t>
             </a:r>
-            <a:endParaRPr lang="en-US" dirty="0"/>
+            <a:endParaRPr lang="en-US" sz="1600" dirty="0"/>
           </a:p>
         </p:txBody>
       </p:sp>
@@ -3796,10 +3801,10 @@
           <a:lstStyle/>
           <a:p>
             <a:r>
-              <a:rPr lang="en-US" sz="1050" dirty="0"/>
+              <a:rPr lang="en-US" sz="1000" dirty="0"/>
               <a:t>GRIB</a:t>
             </a:r>
-            <a:endParaRPr lang="en-US" dirty="0"/>
+            <a:endParaRPr lang="en-US" sz="1600" dirty="0"/>
           </a:p>
         </p:txBody>
       </p:sp>
@@ -3817,7 +3822,7 @@
         </p:nvSpPr>
         <p:spPr>
           <a:xfrm>
-            <a:off x="4956611" y="2744202"/>
+            <a:off x="5208783" y="2248739"/>
             <a:ext cx="365756" cy="651040"/>
           </a:xfrm>
           <a:prstGeom prst="flowChartMagneticDisk">
@@ -3915,7 +3920,7 @@
         </p:nvSpPr>
         <p:spPr>
           <a:xfrm>
-            <a:off x="5660762" y="2891202"/>
+            <a:off x="6181650" y="3156791"/>
             <a:ext cx="645862" cy="376723"/>
           </a:xfrm>
           <a:prstGeom prst="roundRect">
@@ -3943,102 +3948,131 @@
           <a:lstStyle/>
           <a:p>
             <a:pPr algn="ctr"/>
-            <a:endParaRPr lang="en-US"/>
-          </a:p>
-        </p:txBody>
-      </p:sp>
-      <p:cxnSp>
-        <p:nvCxnSpPr>
-          <p:cNvPr id="20" name="Straight Arrow Connector 19">
-            <a:extLst>
-              <a:ext uri="{FF2B5EF4-FFF2-40B4-BE49-F238E27FC236}">
-                <a16:creationId xmlns:a16="http://schemas.microsoft.com/office/drawing/2014/main" id="{40681235-067D-4E56-8BFB-7A74960704DA}"/>
-              </a:ext>
-            </a:extLst>
-          </p:cNvPr>
-          <p:cNvCxnSpPr>
-            <a:cxnSpLocks/>
-          </p:cNvCxnSpPr>
+            <a:r>
+              <a:rPr lang="en-US" sz="900">
+                <a:solidFill>
+                  <a:prstClr val="black"/>
+                </a:solidFill>
+              </a:rPr>
+              <a:t>Unity C# client</a:t>
+            </a:r>
+            <a:endParaRPr lang="en-US" sz="1400"/>
+          </a:p>
+        </p:txBody>
+      </p:sp>
+      <p:grpSp>
+        <p:nvGrpSpPr>
+          <p:cNvPr id="25" name="Group 24">
+            <a:extLst>
+              <a:ext uri="{FF2B5EF4-FFF2-40B4-BE49-F238E27FC236}">
+                <a16:creationId xmlns:a16="http://schemas.microsoft.com/office/drawing/2014/main" id="{389CB2BD-F9EB-4D58-B3B3-AF323EC2E584}"/>
+              </a:ext>
+            </a:extLst>
+          </p:cNvPr>
+          <p:cNvGrpSpPr/>
           <p:nvPr/>
-        </p:nvCxnSpPr>
-        <p:spPr>
-          <a:xfrm flipH="1">
-            <a:off x="5314402" y="3026077"/>
-            <a:ext cx="308458" cy="0"/>
-          </a:xfrm>
-          <a:prstGeom prst="straightConnector1">
-            <a:avLst/>
-          </a:prstGeom>
-          <a:ln>
-            <a:solidFill>
-              <a:schemeClr val="accent2">
-                <a:lumMod val="75000"/>
-              </a:schemeClr>
-            </a:solidFill>
-            <a:tailEnd type="triangle"/>
-          </a:ln>
-        </p:spPr>
-        <p:style>
-          <a:lnRef idx="1">
-            <a:schemeClr val="accent1"/>
-          </a:lnRef>
-          <a:fillRef idx="0">
-            <a:schemeClr val="accent1"/>
-          </a:fillRef>
-          <a:effectRef idx="0">
-            <a:schemeClr val="accent1"/>
-          </a:effectRef>
-          <a:fontRef idx="minor">
-            <a:schemeClr val="tx1"/>
-          </a:fontRef>
-        </p:style>
-      </p:cxnSp>
-      <p:cxnSp>
-        <p:nvCxnSpPr>
-          <p:cNvPr id="21" name="Straight Arrow Connector 20">
-            <a:extLst>
-              <a:ext uri="{FF2B5EF4-FFF2-40B4-BE49-F238E27FC236}">
-                <a16:creationId xmlns:a16="http://schemas.microsoft.com/office/drawing/2014/main" id="{A27F4A60-EFD9-4E56-B9F5-DE3EB1E63045}"/>
-              </a:ext>
-            </a:extLst>
-          </p:cNvPr>
-          <p:cNvCxnSpPr>
-            <a:cxnSpLocks/>
-          </p:cNvCxnSpPr>
-          <p:nvPr/>
-        </p:nvCxnSpPr>
-        <p:spPr>
-          <a:xfrm>
-            <a:off x="5326561" y="3107170"/>
-            <a:ext cx="296299" cy="0"/>
-          </a:xfrm>
-          <a:prstGeom prst="straightConnector1">
-            <a:avLst/>
-          </a:prstGeom>
-          <a:ln>
-            <a:solidFill>
-              <a:schemeClr val="accent2">
-                <a:lumMod val="75000"/>
-              </a:schemeClr>
-            </a:solidFill>
-            <a:tailEnd type="triangle"/>
-          </a:ln>
-        </p:spPr>
-        <p:style>
-          <a:lnRef idx="1">
-            <a:schemeClr val="accent1"/>
-          </a:lnRef>
-          <a:fillRef idx="0">
-            <a:schemeClr val="accent1"/>
-          </a:fillRef>
-          <a:effectRef idx="0">
-            <a:schemeClr val="accent1"/>
-          </a:effectRef>
-          <a:fontRef idx="minor">
-            <a:schemeClr val="tx1"/>
-          </a:fontRef>
-        </p:style>
-      </p:cxnSp>
+        </p:nvGrpSpPr>
+        <p:grpSpPr>
+          <a:xfrm>
+            <a:off x="5812351" y="3304605"/>
+            <a:ext cx="308458" cy="81093"/>
+            <a:chOff x="5314402" y="3026077"/>
+            <a:chExt cx="308458" cy="81093"/>
+          </a:xfrm>
+        </p:grpSpPr>
+        <p:cxnSp>
+          <p:nvCxnSpPr>
+            <p:cNvPr id="20" name="Straight Arrow Connector 19">
+              <a:extLst>
+                <a:ext uri="{FF2B5EF4-FFF2-40B4-BE49-F238E27FC236}">
+                  <a16:creationId xmlns:a16="http://schemas.microsoft.com/office/drawing/2014/main" id="{40681235-067D-4E56-8BFB-7A74960704DA}"/>
+                </a:ext>
+              </a:extLst>
+            </p:cNvPr>
+            <p:cNvCxnSpPr>
+              <a:cxnSpLocks/>
+            </p:cNvCxnSpPr>
+            <p:nvPr/>
+          </p:nvCxnSpPr>
+          <p:spPr>
+            <a:xfrm flipH="1">
+              <a:off x="5314402" y="3026077"/>
+              <a:ext cx="308458" cy="0"/>
+            </a:xfrm>
+            <a:prstGeom prst="straightConnector1">
+              <a:avLst/>
+            </a:prstGeom>
+            <a:ln>
+              <a:solidFill>
+                <a:schemeClr val="accent2">
+                  <a:lumMod val="75000"/>
+                </a:schemeClr>
+              </a:solidFill>
+              <a:tailEnd type="triangle"/>
+            </a:ln>
+          </p:spPr>
+          <p:style>
+            <a:lnRef idx="1">
+              <a:schemeClr val="accent1"/>
+            </a:lnRef>
+            <a:fillRef idx="0">
+              <a:schemeClr val="accent1"/>
+            </a:fillRef>
+            <a:effectRef idx="0">
+              <a:schemeClr val="accent1"/>
+            </a:effectRef>
+            <a:fontRef idx="minor">
+              <a:schemeClr val="tx1"/>
+            </a:fontRef>
+          </p:style>
+        </p:cxnSp>
+        <p:cxnSp>
+          <p:nvCxnSpPr>
+            <p:cNvPr id="21" name="Straight Arrow Connector 20">
+              <a:extLst>
+                <a:ext uri="{FF2B5EF4-FFF2-40B4-BE49-F238E27FC236}">
+                  <a16:creationId xmlns:a16="http://schemas.microsoft.com/office/drawing/2014/main" id="{A27F4A60-EFD9-4E56-B9F5-DE3EB1E63045}"/>
+                </a:ext>
+              </a:extLst>
+            </p:cNvPr>
+            <p:cNvCxnSpPr>
+              <a:cxnSpLocks/>
+            </p:cNvCxnSpPr>
+            <p:nvPr/>
+          </p:nvCxnSpPr>
+          <p:spPr>
+            <a:xfrm>
+              <a:off x="5326561" y="3107170"/>
+              <a:ext cx="296299" cy="0"/>
+            </a:xfrm>
+            <a:prstGeom prst="straightConnector1">
+              <a:avLst/>
+            </a:prstGeom>
+            <a:ln>
+              <a:solidFill>
+                <a:schemeClr val="accent2">
+                  <a:lumMod val="75000"/>
+                </a:schemeClr>
+              </a:solidFill>
+              <a:tailEnd type="triangle"/>
+            </a:ln>
+          </p:spPr>
+          <p:style>
+            <a:lnRef idx="1">
+              <a:schemeClr val="accent1"/>
+            </a:lnRef>
+            <a:fillRef idx="0">
+              <a:schemeClr val="accent1"/>
+            </a:fillRef>
+            <a:effectRef idx="0">
+              <a:schemeClr val="accent1"/>
+            </a:effectRef>
+            <a:fontRef idx="minor">
+              <a:schemeClr val="tx1"/>
+            </a:fontRef>
+          </p:style>
+        </p:cxnSp>
+      </p:grpSp>
       <p:cxnSp>
         <p:nvCxnSpPr>
           <p:cNvPr id="34" name="Straight Arrow Connector 33">
@@ -4057,8 +4091,8 @@
         </p:nvCxnSpPr>
         <p:spPr>
           <a:xfrm flipV="1">
-            <a:off x="4653076" y="3069722"/>
-            <a:ext cx="303535" cy="1"/>
+            <a:off x="4653076" y="2574259"/>
+            <a:ext cx="555707" cy="495464"/>
           </a:xfrm>
           <a:prstGeom prst="straightConnector1">
             <a:avLst/>
@@ -4101,7 +4135,7 @@
         </p:nvSpPr>
         <p:spPr>
           <a:xfrm>
-            <a:off x="4886373" y="2240293"/>
+            <a:off x="5136395" y="2442344"/>
             <a:ext cx="506870" cy="377026"/>
           </a:xfrm>
           <a:prstGeom prst="rect">
@@ -4133,10 +4167,10 @@
       </p:sp>
       <p:sp>
         <p:nvSpPr>
-          <p:cNvPr id="36" name="TextBox 35">
-            <a:extLst>
-              <a:ext uri="{FF2B5EF4-FFF2-40B4-BE49-F238E27FC236}">
-                <a16:creationId xmlns:a16="http://schemas.microsoft.com/office/drawing/2014/main" id="{12CCB87C-364B-47AE-B4F0-0FA74B8B097B}"/>
+          <p:cNvPr id="37" name="TextBox 36">
+            <a:extLst>
+              <a:ext uri="{FF2B5EF4-FFF2-40B4-BE49-F238E27FC236}">
+                <a16:creationId xmlns:a16="http://schemas.microsoft.com/office/drawing/2014/main" id="{A3FE3F65-596F-45E1-AA8B-813D5DA7310A}"/>
               </a:ext>
             </a:extLst>
           </p:cNvPr>
@@ -4145,8 +4179,8 @@
         </p:nvSpPr>
         <p:spPr>
           <a:xfrm>
-            <a:off x="5659726" y="2579089"/>
-            <a:ext cx="647934" cy="253916"/>
+            <a:off x="3941305" y="2463952"/>
+            <a:ext cx="809837" cy="415498"/>
           </a:xfrm>
           <a:prstGeom prst="rect">
             <a:avLst/>
@@ -4159,55 +4193,19 @@
           </a:bodyPr>
           <a:lstStyle/>
           <a:p>
-            <a:r>
-              <a:rPr lang="en-US" sz="1050" dirty="0"/>
-              <a:t>Unity C#</a:t>
-            </a:r>
-            <a:endParaRPr lang="en-US" dirty="0"/>
-          </a:p>
-        </p:txBody>
-      </p:sp>
-      <p:sp>
-        <p:nvSpPr>
-          <p:cNvPr id="37" name="TextBox 36">
-            <a:extLst>
-              <a:ext uri="{FF2B5EF4-FFF2-40B4-BE49-F238E27FC236}">
-                <a16:creationId xmlns:a16="http://schemas.microsoft.com/office/drawing/2014/main" id="{A3FE3F65-596F-45E1-AA8B-813D5DA7310A}"/>
-              </a:ext>
-            </a:extLst>
-          </p:cNvPr>
-          <p:cNvSpPr txBox="1"/>
-          <p:nvPr/>
-        </p:nvSpPr>
-        <p:spPr>
-          <a:xfrm>
-            <a:off x="3968463" y="2314089"/>
-            <a:ext cx="809837" cy="415498"/>
-          </a:xfrm>
-          <a:prstGeom prst="rect">
-            <a:avLst/>
-          </a:prstGeom>
-          <a:noFill/>
-        </p:spPr>
-        <p:txBody>
-          <a:bodyPr wrap="none" rtlCol="0">
-            <a:spAutoFit/>
-          </a:bodyPr>
-          <a:lstStyle/>
-          <a:p>
             <a:pPr algn="ctr"/>
             <a:r>
-              <a:rPr lang="en-US" sz="1050" dirty="0"/>
+              <a:rPr lang="en-US" sz="1000" dirty="0"/>
               <a:t>Python </a:t>
             </a:r>
           </a:p>
           <a:p>
             <a:pPr algn="ctr"/>
             <a:r>
-              <a:rPr lang="en-US" sz="1050" dirty="0"/>
+              <a:rPr lang="en-US" sz="1000" dirty="0"/>
               <a:t>Jupyter Lab</a:t>
             </a:r>
-            <a:endParaRPr lang="en-US" dirty="0"/>
+            <a:endParaRPr lang="en-US" sz="1600" dirty="0"/>
           </a:p>
         </p:txBody>
       </p:sp>
@@ -4369,7 +4367,7 @@
         </p:nvSpPr>
         <p:spPr>
           <a:xfrm>
-            <a:off x="6652984" y="2870341"/>
+            <a:off x="7062397" y="2897782"/>
             <a:ext cx="365756" cy="339886"/>
           </a:xfrm>
           <a:prstGeom prst="cube">
@@ -4418,9 +4416,9 @@
           <p:nvPr/>
         </p:nvCxnSpPr>
         <p:spPr>
-          <a:xfrm>
-            <a:off x="6306624" y="3079564"/>
-            <a:ext cx="346360" cy="3206"/>
+          <a:xfrm flipV="1">
+            <a:off x="6827512" y="3110211"/>
+            <a:ext cx="234885" cy="234942"/>
           </a:xfrm>
           <a:prstGeom prst="straightConnector1">
             <a:avLst/>
@@ -4463,7 +4461,7 @@
         </p:nvSpPr>
         <p:spPr>
           <a:xfrm>
-            <a:off x="6457393" y="2314089"/>
+            <a:off x="6850088" y="2465703"/>
             <a:ext cx="756938" cy="415498"/>
           </a:xfrm>
           <a:prstGeom prst="rect">
@@ -4479,17 +4477,17 @@
           <a:p>
             <a:pPr algn="ctr"/>
             <a:r>
-              <a:rPr lang="en-US" sz="1050" dirty="0"/>
+              <a:rPr lang="en-US" sz="1000" dirty="0"/>
               <a:t>Unity</a:t>
             </a:r>
           </a:p>
           <a:p>
             <a:pPr algn="ctr"/>
             <a:r>
-              <a:rPr lang="en-US" sz="1050" dirty="0"/>
+              <a:rPr lang="en-US" sz="1000" dirty="0"/>
               <a:t>3DTexture</a:t>
             </a:r>
-            <a:endParaRPr lang="en-US" dirty="0"/>
+            <a:endParaRPr lang="en-US" sz="1600" dirty="0"/>
           </a:p>
         </p:txBody>
       </p:sp>
@@ -4507,7 +4505,7 @@
         </p:nvSpPr>
         <p:spPr>
           <a:xfrm>
-            <a:off x="7322275" y="2596609"/>
+            <a:off x="7663039" y="2570359"/>
             <a:ext cx="645862" cy="906420"/>
           </a:xfrm>
           <a:prstGeom prst="roundRect">
@@ -4553,8 +4551,8 @@
         </p:nvSpPr>
         <p:spPr>
           <a:xfrm>
-            <a:off x="7423870" y="3178652"/>
-            <a:ext cx="442672" cy="210098"/>
+            <a:off x="7720049" y="3248304"/>
+            <a:ext cx="479048" cy="133220"/>
           </a:xfrm>
           <a:prstGeom prst="roundRect">
             <a:avLst/>
@@ -4588,14 +4586,14 @@
           <a:p>
             <a:pPr algn="ctr"/>
             <a:r>
-              <a:rPr lang="en-US" sz="1050" dirty="0">
+              <a:rPr lang="en-US" sz="1000" dirty="0">
                 <a:solidFill>
                   <a:schemeClr val="tx1"/>
                 </a:solidFill>
               </a:rPr>
               <a:t>VFX</a:t>
             </a:r>
-            <a:endParaRPr lang="en-US" dirty="0">
+            <a:endParaRPr lang="en-US" sz="1600" dirty="0">
               <a:solidFill>
                 <a:schemeClr val="tx1"/>
               </a:solidFill>
@@ -4617,7 +4615,7 @@
         </p:nvSpPr>
         <p:spPr>
           <a:xfrm>
-            <a:off x="7316659" y="2267922"/>
+            <a:off x="7670819" y="2554774"/>
             <a:ext cx="630301" cy="253916"/>
           </a:xfrm>
           <a:prstGeom prst="rect">
@@ -4651,14 +4649,14 @@
           <p:cNvCxnSpPr>
             <a:cxnSpLocks/>
             <a:stCxn id="52" idx="5"/>
-            <a:endCxn id="60" idx="1"/>
+            <a:endCxn id="59" idx="1"/>
           </p:cNvCxnSpPr>
           <p:nvPr/>
         </p:nvCxnSpPr>
         <p:spPr>
-          <a:xfrm>
-            <a:off x="7018740" y="2997798"/>
-            <a:ext cx="405130" cy="285903"/>
+          <a:xfrm flipV="1">
+            <a:off x="7428153" y="3023569"/>
+            <a:ext cx="234886" cy="1670"/>
           </a:xfrm>
           <a:prstGeom prst="straightConnector1">
             <a:avLst/>
@@ -4699,13 +4697,14 @@
           <p:cNvCxnSpPr>
             <a:cxnSpLocks/>
             <a:stCxn id="59" idx="3"/>
+            <a:endCxn id="43" idx="2"/>
           </p:cNvCxnSpPr>
           <p:nvPr/>
         </p:nvCxnSpPr>
         <p:spPr>
           <a:xfrm flipV="1">
-            <a:off x="7968137" y="2641422"/>
-            <a:ext cx="684755" cy="408397"/>
+            <a:off x="8308901" y="2613048"/>
+            <a:ext cx="438830" cy="410521"/>
           </a:xfrm>
           <a:prstGeom prst="straightConnector1">
             <a:avLst/>
@@ -4746,13 +4745,14 @@
           <p:cNvCxnSpPr>
             <a:cxnSpLocks/>
             <a:stCxn id="59" idx="3"/>
+            <a:endCxn id="64" idx="2"/>
           </p:cNvCxnSpPr>
           <p:nvPr/>
         </p:nvCxnSpPr>
         <p:spPr>
           <a:xfrm flipV="1">
-            <a:off x="7968137" y="3040284"/>
-            <a:ext cx="684755" cy="9535"/>
+            <a:off x="8308901" y="3013309"/>
+            <a:ext cx="438830" cy="10260"/>
           </a:xfrm>
           <a:prstGeom prst="straightConnector1">
             <a:avLst/>
@@ -4793,13 +4793,14 @@
           <p:cNvCxnSpPr>
             <a:cxnSpLocks/>
             <a:stCxn id="59" idx="3"/>
+            <a:endCxn id="65" idx="2"/>
           </p:cNvCxnSpPr>
           <p:nvPr/>
         </p:nvCxnSpPr>
         <p:spPr>
           <a:xfrm>
-            <a:off x="7968137" y="3049819"/>
-            <a:ext cx="684755" cy="379181"/>
+            <a:off x="8308901" y="3023569"/>
+            <a:ext cx="438830" cy="390001"/>
           </a:xfrm>
           <a:prstGeom prst="straightConnector1">
             <a:avLst/>
@@ -4949,6 +4950,330 @@
               <a:t>nb</a:t>
             </a:r>
             <a:endParaRPr lang="en-US" sz="1200" dirty="0">
+              <a:solidFill>
+                <a:schemeClr val="tx1"/>
+              </a:solidFill>
+            </a:endParaRPr>
+          </a:p>
+        </p:txBody>
+      </p:sp>
+      <p:sp>
+        <p:nvSpPr>
+          <p:cNvPr id="46" name="Rectangle: Rounded Corners 45">
+            <a:extLst>
+              <a:ext uri="{FF2B5EF4-FFF2-40B4-BE49-F238E27FC236}">
+                <a16:creationId xmlns:a16="http://schemas.microsoft.com/office/drawing/2014/main" id="{D07AC855-98FD-4A6C-B7F1-9503F72C9DC8}"/>
+              </a:ext>
+            </a:extLst>
+          </p:cNvPr>
+          <p:cNvSpPr/>
+          <p:nvPr/>
+        </p:nvSpPr>
+        <p:spPr>
+          <a:xfrm>
+            <a:off x="4969091" y="3166428"/>
+            <a:ext cx="822268" cy="376723"/>
+          </a:xfrm>
+          <a:prstGeom prst="roundRect">
+            <a:avLst/>
+          </a:prstGeom>
+        </p:spPr>
+        <p:style>
+          <a:lnRef idx="2">
+            <a:schemeClr val="accent1">
+              <a:shade val="50000"/>
+            </a:schemeClr>
+          </a:lnRef>
+          <a:fillRef idx="1">
+            <a:schemeClr val="accent1"/>
+          </a:fillRef>
+          <a:effectRef idx="0">
+            <a:schemeClr val="accent1"/>
+          </a:effectRef>
+          <a:fontRef idx="minor">
+            <a:schemeClr val="lt1"/>
+          </a:fontRef>
+        </p:style>
+        <p:txBody>
+          <a:bodyPr rtlCol="0" anchor="ctr"/>
+          <a:lstStyle/>
+          <a:p>
+            <a:pPr algn="ctr"/>
+            <a:r>
+              <a:rPr lang="en-US" sz="900" dirty="0">
+                <a:solidFill>
+                  <a:prstClr val="black"/>
+                </a:solidFill>
+              </a:rPr>
+              <a:t>Python Flask REST server</a:t>
+            </a:r>
+            <a:endParaRPr lang="en-US" sz="1400" dirty="0"/>
+          </a:p>
+        </p:txBody>
+      </p:sp>
+      <p:cxnSp>
+        <p:nvCxnSpPr>
+          <p:cNvPr id="49" name="Straight Arrow Connector 48">
+            <a:extLst>
+              <a:ext uri="{FF2B5EF4-FFF2-40B4-BE49-F238E27FC236}">
+                <a16:creationId xmlns:a16="http://schemas.microsoft.com/office/drawing/2014/main" id="{2E72654B-8AD4-4F27-9F6D-962C7D3D8DD6}"/>
+              </a:ext>
+            </a:extLst>
+          </p:cNvPr>
+          <p:cNvCxnSpPr>
+            <a:cxnSpLocks/>
+            <a:stCxn id="16" idx="3"/>
+            <a:endCxn id="46" idx="0"/>
+          </p:cNvCxnSpPr>
+          <p:nvPr/>
+        </p:nvCxnSpPr>
+        <p:spPr>
+          <a:xfrm flipH="1">
+            <a:off x="5380225" y="2899779"/>
+            <a:ext cx="11436" cy="266649"/>
+          </a:xfrm>
+          <a:prstGeom prst="straightConnector1">
+            <a:avLst/>
+          </a:prstGeom>
+          <a:ln w="19050">
+            <a:solidFill>
+              <a:schemeClr val="accent2">
+                <a:lumMod val="75000"/>
+              </a:schemeClr>
+            </a:solidFill>
+            <a:tailEnd type="triangle"/>
+          </a:ln>
+        </p:spPr>
+        <p:style>
+          <a:lnRef idx="1">
+            <a:schemeClr val="accent1"/>
+          </a:lnRef>
+          <a:fillRef idx="0">
+            <a:schemeClr val="accent1"/>
+          </a:fillRef>
+          <a:effectRef idx="0">
+            <a:schemeClr val="accent1"/>
+          </a:effectRef>
+          <a:fontRef idx="minor">
+            <a:schemeClr val="tx1"/>
+          </a:fontRef>
+        </p:style>
+      </p:cxnSp>
+      <p:sp>
+        <p:nvSpPr>
+          <p:cNvPr id="43" name="Oval 42">
+            <a:extLst>
+              <a:ext uri="{FF2B5EF4-FFF2-40B4-BE49-F238E27FC236}">
+                <a16:creationId xmlns:a16="http://schemas.microsoft.com/office/drawing/2014/main" id="{A816EDB9-2F40-400F-9DD3-1D0F67FBF22F}"/>
+              </a:ext>
+            </a:extLst>
+          </p:cNvPr>
+          <p:cNvSpPr/>
+          <p:nvPr/>
+        </p:nvSpPr>
+        <p:spPr>
+          <a:xfrm>
+            <a:off x="8747731" y="2469565"/>
+            <a:ext cx="809599" cy="286965"/>
+          </a:xfrm>
+          <a:prstGeom prst="ellipse">
+            <a:avLst/>
+          </a:prstGeom>
+        </p:spPr>
+        <p:style>
+          <a:lnRef idx="2">
+            <a:schemeClr val="accent1">
+              <a:shade val="50000"/>
+            </a:schemeClr>
+          </a:lnRef>
+          <a:fillRef idx="1">
+            <a:schemeClr val="accent1"/>
+          </a:fillRef>
+          <a:effectRef idx="0">
+            <a:schemeClr val="accent1"/>
+          </a:effectRef>
+          <a:fontRef idx="minor">
+            <a:schemeClr val="lt1"/>
+          </a:fontRef>
+        </p:style>
+        <p:txBody>
+          <a:bodyPr rtlCol="0" anchor="ctr"/>
+          <a:lstStyle/>
+          <a:p>
+            <a:pPr algn="ctr"/>
+            <a:r>
+              <a:rPr lang="en-US" sz="900" dirty="0">
+                <a:solidFill>
+                  <a:schemeClr val="tx1"/>
+                </a:solidFill>
+              </a:rPr>
+              <a:t>SOS</a:t>
+            </a:r>
+          </a:p>
+          <a:p>
+            <a:pPr algn="ctr"/>
+            <a:r>
+              <a:rPr lang="en-US" sz="900" dirty="0">
+                <a:solidFill>
+                  <a:schemeClr val="tx1"/>
+                </a:solidFill>
+              </a:rPr>
+              <a:t>SOS-X</a:t>
+            </a:r>
+            <a:endParaRPr lang="en-US" dirty="0">
+              <a:solidFill>
+                <a:schemeClr val="tx1"/>
+              </a:solidFill>
+            </a:endParaRPr>
+          </a:p>
+        </p:txBody>
+      </p:sp>
+      <p:sp>
+        <p:nvSpPr>
+          <p:cNvPr id="63" name="TextBox 62">
+            <a:extLst>
+              <a:ext uri="{FF2B5EF4-FFF2-40B4-BE49-F238E27FC236}">
+                <a16:creationId xmlns:a16="http://schemas.microsoft.com/office/drawing/2014/main" id="{C5615757-08FF-4D6B-B151-25C6B648952E}"/>
+              </a:ext>
+            </a:extLst>
+          </p:cNvPr>
+          <p:cNvSpPr txBox="1"/>
+          <p:nvPr/>
+        </p:nvSpPr>
+        <p:spPr>
+          <a:xfrm>
+            <a:off x="8282021" y="3363608"/>
+            <a:ext cx="470000" cy="215444"/>
+          </a:xfrm>
+          <a:prstGeom prst="rect">
+            <a:avLst/>
+          </a:prstGeom>
+          <a:noFill/>
+        </p:spPr>
+        <p:txBody>
+          <a:bodyPr wrap="none" rtlCol="0">
+            <a:spAutoFit/>
+          </a:bodyPr>
+          <a:lstStyle/>
+          <a:p>
+            <a:pPr algn="ctr"/>
+            <a:r>
+              <a:rPr lang="en-US" sz="800" dirty="0"/>
+              <a:t>deploy</a:t>
+            </a:r>
+            <a:endParaRPr lang="en-US" sz="1200" dirty="0"/>
+          </a:p>
+        </p:txBody>
+      </p:sp>
+      <p:sp>
+        <p:nvSpPr>
+          <p:cNvPr id="64" name="Oval 63">
+            <a:extLst>
+              <a:ext uri="{FF2B5EF4-FFF2-40B4-BE49-F238E27FC236}">
+                <a16:creationId xmlns:a16="http://schemas.microsoft.com/office/drawing/2014/main" id="{F6535E40-0EF2-4497-9186-2DFECEEEC002}"/>
+              </a:ext>
+            </a:extLst>
+          </p:cNvPr>
+          <p:cNvSpPr/>
+          <p:nvPr/>
+        </p:nvSpPr>
+        <p:spPr>
+          <a:xfrm>
+            <a:off x="8747731" y="2869826"/>
+            <a:ext cx="809599" cy="286965"/>
+          </a:xfrm>
+          <a:prstGeom prst="ellipse">
+            <a:avLst/>
+          </a:prstGeom>
+        </p:spPr>
+        <p:style>
+          <a:lnRef idx="2">
+            <a:schemeClr val="accent1">
+              <a:shade val="50000"/>
+            </a:schemeClr>
+          </a:lnRef>
+          <a:fillRef idx="1">
+            <a:schemeClr val="accent1"/>
+          </a:fillRef>
+          <a:effectRef idx="0">
+            <a:schemeClr val="accent1"/>
+          </a:effectRef>
+          <a:fontRef idx="minor">
+            <a:schemeClr val="lt1"/>
+          </a:fontRef>
+        </p:style>
+        <p:txBody>
+          <a:bodyPr rtlCol="0" anchor="ctr"/>
+          <a:lstStyle/>
+          <a:p>
+            <a:pPr algn="ctr"/>
+            <a:r>
+              <a:rPr lang="en-US" sz="900" dirty="0">
+                <a:solidFill>
+                  <a:schemeClr val="tx1"/>
+                </a:solidFill>
+              </a:rPr>
+              <a:t>browser</a:t>
+            </a:r>
+            <a:endParaRPr lang="en-US" dirty="0">
+              <a:solidFill>
+                <a:schemeClr val="tx1"/>
+              </a:solidFill>
+            </a:endParaRPr>
+          </a:p>
+        </p:txBody>
+      </p:sp>
+      <p:sp>
+        <p:nvSpPr>
+          <p:cNvPr id="65" name="Oval 64">
+            <a:extLst>
+              <a:ext uri="{FF2B5EF4-FFF2-40B4-BE49-F238E27FC236}">
+                <a16:creationId xmlns:a16="http://schemas.microsoft.com/office/drawing/2014/main" id="{42A130A5-45D9-4DBF-A193-4C7E6C99FD46}"/>
+              </a:ext>
+            </a:extLst>
+          </p:cNvPr>
+          <p:cNvSpPr/>
+          <p:nvPr/>
+        </p:nvSpPr>
+        <p:spPr>
+          <a:xfrm>
+            <a:off x="8747731" y="3270087"/>
+            <a:ext cx="809599" cy="286965"/>
+          </a:xfrm>
+          <a:prstGeom prst="ellipse">
+            <a:avLst/>
+          </a:prstGeom>
+        </p:spPr>
+        <p:style>
+          <a:lnRef idx="2">
+            <a:schemeClr val="accent1">
+              <a:shade val="50000"/>
+            </a:schemeClr>
+          </a:lnRef>
+          <a:fillRef idx="1">
+            <a:schemeClr val="accent1"/>
+          </a:fillRef>
+          <a:effectRef idx="0">
+            <a:schemeClr val="accent1"/>
+          </a:effectRef>
+          <a:fontRef idx="minor">
+            <a:schemeClr val="lt1"/>
+          </a:fontRef>
+        </p:style>
+        <p:txBody>
+          <a:bodyPr rtlCol="0" anchor="ctr"/>
+          <a:lstStyle/>
+          <a:p>
+            <a:pPr algn="ctr"/>
+            <a:r>
+              <a:rPr lang="en-US" sz="900" dirty="0">
+                <a:solidFill>
+                  <a:schemeClr val="tx1"/>
+                </a:solidFill>
+              </a:rPr>
+              <a:t>VR/AR</a:t>
+            </a:r>
+            <a:endParaRPr lang="en-US" dirty="0">
               <a:solidFill>
                 <a:schemeClr val="tx1"/>
               </a:solidFill>

</xml_diff>